<commit_message>
worked on claim code presentations
</commit_message>
<xml_diff>
--- a/PowerPoints/Phase 3 - Claims Terminology/013 What are icd code.pptx
+++ b/PowerPoints/Phase 3 - Claims Terminology/013 What are icd code.pptx
@@ -7,11 +7,10 @@
   </p:sldMasterIdLst>
   <p:sldIdLst>
     <p:sldId id="256" r:id="rId3"/>
-    <p:sldId id="257" r:id="rId4"/>
-    <p:sldId id="258" r:id="rId5"/>
-    <p:sldId id="259" r:id="rId6"/>
-    <p:sldId id="260" r:id="rId7"/>
-    <p:sldId id="261" r:id="rId8"/>
+    <p:sldId id="262" r:id="rId4"/>
+    <p:sldId id="263" r:id="rId5"/>
+    <p:sldId id="257" r:id="rId6"/>
+    <p:sldId id="261" r:id="rId7"/>
   </p:sldIdLst>
   <p:sldSz cx="12192000" cy="6858000"/>
   <p:notesSz cx="6858000" cy="9144000"/>
@@ -1678,7 +1677,7 @@
   </p:clrMapOvr>
   <p:extLst>
     <p:ext uri="{DCECCB84-F9BA-43D5-87BE-67443E8EF086}">
-      <p15:sldGuideLst xmlns="" xmlns:p15="http://schemas.microsoft.com/office/powerpoint/2012/main"/>
+      <p15:sldGuideLst xmlns:p15="http://schemas.microsoft.com/office/powerpoint/2012/main" xmlns=""/>
     </p:ext>
   </p:extLst>
 </p:sldLayout>
@@ -2105,7 +2104,7 @@
   </p:clrMapOvr>
   <p:extLst>
     <p:ext uri="{DCECCB84-F9BA-43D5-87BE-67443E8EF086}">
-      <p15:sldGuideLst xmlns="" xmlns:p15="http://schemas.microsoft.com/office/powerpoint/2012/main"/>
+      <p15:sldGuideLst xmlns:p15="http://schemas.microsoft.com/office/powerpoint/2012/main" xmlns=""/>
     </p:ext>
   </p:extLst>
 </p:sldLayout>
@@ -2648,7 +2647,7 @@
   </p:clrMapOvr>
   <p:extLst>
     <p:ext uri="{DCECCB84-F9BA-43D5-87BE-67443E8EF086}">
-      <p15:sldGuideLst xmlns="" xmlns:p15="http://schemas.microsoft.com/office/powerpoint/2012/main"/>
+      <p15:sldGuideLst xmlns:p15="http://schemas.microsoft.com/office/powerpoint/2012/main" xmlns=""/>
     </p:ext>
   </p:extLst>
 </p:sldLayout>
@@ -4194,7 +4193,7 @@
   </p:clrMapOvr>
   <p:extLst>
     <p:ext uri="{DCECCB84-F9BA-43D5-87BE-67443E8EF086}">
-      <p15:sldGuideLst xmlns="" xmlns:p15="http://schemas.microsoft.com/office/powerpoint/2012/main"/>
+      <p15:sldGuideLst xmlns:p15="http://schemas.microsoft.com/office/powerpoint/2012/main" xmlns=""/>
     </p:ext>
   </p:extLst>
 </p:sldLayout>
@@ -4569,7 +4568,7 @@
   </p:clrMapOvr>
   <p:extLst>
     <p:ext uri="{DCECCB84-F9BA-43D5-87BE-67443E8EF086}">
-      <p15:sldGuideLst xmlns="" xmlns:p15="http://schemas.microsoft.com/office/powerpoint/2012/main"/>
+      <p15:sldGuideLst xmlns:p15="http://schemas.microsoft.com/office/powerpoint/2012/main" xmlns=""/>
     </p:ext>
   </p:extLst>
 </p:sldLayout>
@@ -5071,7 +5070,7 @@
   </p:clrMapOvr>
   <p:extLst>
     <p:ext uri="{DCECCB84-F9BA-43D5-87BE-67443E8EF086}">
-      <p15:sldGuideLst xmlns="" xmlns:p15="http://schemas.microsoft.com/office/powerpoint/2012/main"/>
+      <p15:sldGuideLst xmlns:p15="http://schemas.microsoft.com/office/powerpoint/2012/main" xmlns=""/>
     </p:ext>
   </p:extLst>
 </p:sldLayout>
@@ -5870,7 +5869,7 @@
   </p:txStyles>
   <p:extLst>
     <p:ext uri="{27BBF7A9-308A-43DC-89C8-2F10F3537804}">
-      <p15:sldGuideLst xmlns="" xmlns:p15="http://schemas.microsoft.com/office/powerpoint/2012/main"/>
+      <p15:sldGuideLst xmlns:p15="http://schemas.microsoft.com/office/powerpoint/2012/main" xmlns=""/>
     </p:ext>
   </p:extLst>
 </p:sldMaster>
@@ -6567,7 +6566,7 @@
   </p:txStyles>
   <p:extLst>
     <p:ext uri="{27BBF7A9-308A-43DC-89C8-2F10F3537804}">
-      <p15:sldGuideLst xmlns="" xmlns:p15="http://schemas.microsoft.com/office/powerpoint/2012/main"/>
+      <p15:sldGuideLst xmlns:p15="http://schemas.microsoft.com/office/powerpoint/2012/main" xmlns=""/>
     </p:ext>
   </p:extLst>
 </p:sldMaster>
@@ -6681,7 +6680,11 @@
           <a:bodyPr/>
           <a:lstStyle/>
           <a:p>
-            <a:endParaRPr lang="en-US"/>
+            <a:r>
+              <a:rPr lang="en-US" dirty="0" smtClean="0"/>
+              <a:t>ICD-9</a:t>
+            </a:r>
+            <a:endParaRPr lang="en-US" dirty="0"/>
           </a:p>
         </p:txBody>
       </p:sp>
@@ -6700,6 +6703,28 @@
           <a:bodyPr/>
           <a:lstStyle/>
           <a:p>
+            <a:r>
+              <a:rPr lang="en-US" dirty="0" smtClean="0"/>
+              <a:t>The “International Statistical Classification or Diseases and Related Health Problems” is an international standard for recording medical diagnoses.</a:t>
+            </a:r>
+          </a:p>
+          <a:p>
+            <a:r>
+              <a:rPr lang="en-US" dirty="0" smtClean="0"/>
+              <a:t>ICD is maintained by the World Health organization.  </a:t>
+            </a:r>
+          </a:p>
+          <a:p>
+            <a:r>
+              <a:rPr lang="en-US" dirty="0" smtClean="0"/>
+              <a:t>ICD-9 was the version approved in 1978.</a:t>
+            </a:r>
+          </a:p>
+          <a:p>
+            <a:r>
+              <a:rPr lang="en-US" dirty="0" smtClean="0"/>
+              <a:t>ICD-9 codes contain between three and five digits.  The fourth and fifth digits contain additional details that may not be required for all purposes.</a:t>
+            </a:r>
             <a:endParaRPr lang="en-US" dirty="0"/>
           </a:p>
         </p:txBody>
@@ -6707,7 +6732,7 @@
     </p:spTree>
     <p:extLst>
       <p:ext uri="{BB962C8B-B14F-4D97-AF65-F5344CB8AC3E}">
-        <p14:creationId xmlns:p14="http://schemas.microsoft.com/office/powerpoint/2010/main" val="3205627481"/>
+        <p14:creationId xmlns:p14="http://schemas.microsoft.com/office/powerpoint/2010/main" val="2818337575"/>
       </p:ext>
     </p:extLst>
   </p:cSld>
@@ -6749,7 +6774,11 @@
           <a:bodyPr/>
           <a:lstStyle/>
           <a:p>
-            <a:endParaRPr lang="en-US"/>
+            <a:r>
+              <a:rPr lang="en-US" dirty="0" smtClean="0"/>
+              <a:t>ICD-10</a:t>
+            </a:r>
+            <a:endParaRPr lang="en-US" dirty="0"/>
           </a:p>
         </p:txBody>
       </p:sp>
@@ -6763,11 +6792,62 @@
             <p:ph idx="1"/>
           </p:nvPr>
         </p:nvSpPr>
-        <p:spPr/>
-        <p:txBody>
-          <a:bodyPr/>
-          <a:lstStyle/>
-          <a:p>
+        <p:spPr>
+          <a:xfrm>
+            <a:off x="1534696" y="2015732"/>
+            <a:ext cx="9520158" cy="4004924"/>
+          </a:xfrm>
+        </p:spPr>
+        <p:txBody>
+          <a:bodyPr>
+            <a:normAutofit/>
+          </a:bodyPr>
+          <a:lstStyle/>
+          <a:p>
+            <a:r>
+              <a:rPr lang="en-US" dirty="0"/>
+              <a:t>ICD-10 contains over 14,400 different codes.</a:t>
+            </a:r>
+          </a:p>
+          <a:p>
+            <a:r>
+              <a:rPr lang="en-US" dirty="0" smtClean="0"/>
+              <a:t>ICD-10-CM, the “Clinical Modifications” version used in the United States, contains over 68,000 codes.</a:t>
+            </a:r>
+          </a:p>
+          <a:p>
+            <a:r>
+              <a:rPr lang="en-US" dirty="0" smtClean="0"/>
+              <a:t>The United States transitioned to ICD-10 on October 1</a:t>
+            </a:r>
+            <a:r>
+              <a:rPr lang="en-US" baseline="30000" dirty="0" smtClean="0"/>
+              <a:t>st</a:t>
+            </a:r>
+            <a:r>
+              <a:rPr lang="en-US" dirty="0" smtClean="0"/>
+              <a:t>, 2015.</a:t>
+            </a:r>
+          </a:p>
+          <a:p>
+            <a:r>
+              <a:rPr lang="en-US" dirty="0" smtClean="0"/>
+              <a:t>ICD-10 provides detailed diagnosis data, along with information about the reason for a health care visit.</a:t>
+            </a:r>
+          </a:p>
+          <a:p>
+            <a:r>
+              <a:rPr lang="en-US" dirty="0" smtClean="0"/>
+              <a:t>ICD-10 also permits recording laboratory results and quality metrics such as </a:t>
+            </a:r>
+            <a:r>
+              <a:rPr lang="en-US" dirty="0"/>
+              <a:t>b</a:t>
+            </a:r>
+            <a:r>
+              <a:rPr lang="en-US" dirty="0" smtClean="0"/>
+              <a:t>ody-mass index and </a:t>
+            </a:r>
             <a:endParaRPr lang="en-US" dirty="0"/>
           </a:p>
         </p:txBody>
@@ -6775,7 +6855,7 @@
     </p:spTree>
     <p:extLst>
       <p:ext uri="{BB962C8B-B14F-4D97-AF65-F5344CB8AC3E}">
-        <p14:creationId xmlns:p14="http://schemas.microsoft.com/office/powerpoint/2010/main" val="840871784"/>
+        <p14:creationId xmlns:p14="http://schemas.microsoft.com/office/powerpoint/2010/main" val="376171777"/>
       </p:ext>
     </p:extLst>
   </p:cSld>
@@ -6817,7 +6897,11 @@
           <a:bodyPr/>
           <a:lstStyle/>
           <a:p>
-            <a:endParaRPr lang="en-US"/>
+            <a:r>
+              <a:rPr lang="en-US" dirty="0" smtClean="0"/>
+              <a:t>Hierarchical Condition Categories</a:t>
+            </a:r>
+            <a:endParaRPr lang="en-US" dirty="0"/>
           </a:p>
         </p:txBody>
       </p:sp>
@@ -6836,6 +6920,44 @@
           <a:bodyPr/>
           <a:lstStyle/>
           <a:p>
+            <a:r>
+              <a:rPr lang="en-US" dirty="0" smtClean="0"/>
+              <a:t>Hierarchical Condition Categories (HCCs) group ICD codes.</a:t>
+            </a:r>
+          </a:p>
+          <a:p>
+            <a:r>
+              <a:rPr lang="en-US" dirty="0"/>
+              <a:t>HCCs are </a:t>
+            </a:r>
+            <a:r>
+              <a:rPr lang="en-US" dirty="0" smtClean="0"/>
+              <a:t>defined by </a:t>
+            </a:r>
+            <a:r>
+              <a:rPr lang="en-US" dirty="0"/>
+              <a:t>the Center for Medicare and Medicaid Services</a:t>
+            </a:r>
+            <a:r>
+              <a:rPr lang="en-US" dirty="0" smtClean="0"/>
+              <a:t>.</a:t>
+            </a:r>
+          </a:p>
+          <a:p>
+            <a:r>
+              <a:rPr lang="en-US" dirty="0" smtClean="0"/>
+              <a:t>HCCs provide a high-level look at the patient’s main medical conditions.  </a:t>
+            </a:r>
+          </a:p>
+          <a:p>
+            <a:r>
+              <a:rPr lang="en-US" dirty="0" smtClean="0"/>
+              <a:t>HCCs are primarily used to measure a patients likely futures costs based on chronic conditions in the patient’s </a:t>
+            </a:r>
+            <a:r>
+              <a:rPr lang="en-US" smtClean="0"/>
+              <a:t>medical history.</a:t>
+            </a:r>
             <a:endParaRPr lang="en-US" dirty="0"/>
           </a:p>
         </p:txBody>
@@ -6843,7 +6965,7 @@
     </p:spTree>
     <p:extLst>
       <p:ext uri="{BB962C8B-B14F-4D97-AF65-F5344CB8AC3E}">
-        <p14:creationId xmlns:p14="http://schemas.microsoft.com/office/powerpoint/2010/main" val="840871784"/>
+        <p14:creationId xmlns:p14="http://schemas.microsoft.com/office/powerpoint/2010/main" val="3205627481"/>
       </p:ext>
     </p:extLst>
   </p:cSld>
@@ -6885,6 +7007,10 @@
           <a:bodyPr/>
           <a:lstStyle/>
           <a:p>
+            <a:r>
+              <a:rPr lang="en-US" smtClean="0"/>
+              <a:t>References</a:t>
+            </a:r>
             <a:endParaRPr lang="en-US"/>
           </a:p>
         </p:txBody>
@@ -6904,77 +7030,48 @@
           <a:bodyPr/>
           <a:lstStyle/>
           <a:p>
-            <a:endParaRPr lang="en-US" dirty="0"/>
-          </a:p>
-        </p:txBody>
-      </p:sp>
-    </p:spTree>
-    <p:extLst>
-      <p:ext uri="{BB962C8B-B14F-4D97-AF65-F5344CB8AC3E}">
-        <p14:creationId xmlns:p14="http://schemas.microsoft.com/office/powerpoint/2010/main" val="840871784"/>
-      </p:ext>
-    </p:extLst>
-  </p:cSld>
-  <p:clrMapOvr>
-    <a:masterClrMapping/>
-  </p:clrMapOvr>
-</p:sld>
-</file>
-
-<file path=ppt/slides/slide6.xml><?xml version="1.0" encoding="utf-8"?>
-<p:sld xmlns:a="http://schemas.openxmlformats.org/drawingml/2006/main" xmlns:r="http://schemas.openxmlformats.org/officeDocument/2006/relationships" xmlns:p="http://schemas.openxmlformats.org/presentationml/2006/main">
-  <p:cSld>
-    <p:spTree>
-      <p:nvGrpSpPr>
-        <p:cNvPr id="1" name=""/>
-        <p:cNvGrpSpPr/>
-        <p:nvPr/>
-      </p:nvGrpSpPr>
-      <p:grpSpPr>
-        <a:xfrm>
-          <a:off x="0" y="0"/>
-          <a:ext cx="0" cy="0"/>
-          <a:chOff x="0" y="0"/>
-          <a:chExt cx="0" cy="0"/>
-        </a:xfrm>
-      </p:grpSpPr>
-      <p:sp>
-        <p:nvSpPr>
-          <p:cNvPr id="2" name="Title 1"/>
-          <p:cNvSpPr>
-            <a:spLocks noGrp="1"/>
-          </p:cNvSpPr>
-          <p:nvPr>
-            <p:ph type="title"/>
-          </p:nvPr>
-        </p:nvSpPr>
-        <p:spPr/>
-        <p:txBody>
-          <a:bodyPr/>
-          <a:lstStyle/>
-          <a:p>
-            <a:r>
-              <a:rPr lang="en-US" smtClean="0"/>
-              <a:t>References</a:t>
-            </a:r>
-            <a:endParaRPr lang="en-US"/>
-          </a:p>
-        </p:txBody>
-      </p:sp>
-      <p:sp>
-        <p:nvSpPr>
-          <p:cNvPr id="3" name="Content Placeholder 2"/>
-          <p:cNvSpPr>
-            <a:spLocks noGrp="1"/>
-          </p:cNvSpPr>
-          <p:nvPr>
-            <p:ph idx="1"/>
-          </p:nvPr>
-        </p:nvSpPr>
-        <p:spPr/>
-        <p:txBody>
-          <a:bodyPr/>
-          <a:lstStyle/>
+            <a:r>
+              <a:rPr lang="en-US" dirty="0">
+                <a:hlinkClick r:id="rId2"/>
+              </a:rPr>
+              <a:t>https://</a:t>
+            </a:r>
+            <a:r>
+              <a:rPr lang="en-US" dirty="0" smtClean="0">
+                <a:hlinkClick r:id="rId2"/>
+              </a:rPr>
+              <a:t>en.wikipedia.org/wiki/International_Statistical_Classification_of_Diseases_and_Related_Health_Problems</a:t>
+            </a:r>
+          </a:p>
+          <a:p>
+            <a:r>
+              <a:rPr lang="en-US" dirty="0">
+                <a:hlinkClick r:id="rId2"/>
+              </a:rPr>
+              <a:t>https://en.wikipedia.org/wiki/ICD-10</a:t>
+            </a:r>
+          </a:p>
+          <a:p>
+            <a:r>
+              <a:rPr lang="en-US" dirty="0" smtClean="0">
+                <a:hlinkClick r:id="rId2"/>
+              </a:rPr>
+              <a:t>https</a:t>
+            </a:r>
+            <a:r>
+              <a:rPr lang="en-US" dirty="0">
+                <a:hlinkClick r:id="rId2"/>
+              </a:rPr>
+              <a:t>://</a:t>
+            </a:r>
+            <a:r>
+              <a:rPr lang="en-US" dirty="0" smtClean="0">
+                <a:hlinkClick r:id="rId2"/>
+              </a:rPr>
+              <a:t>www.cms.gov/Research-Statistics-Data-and-Systems/Research/HealthCareFinancingReview/downloads/04Summerpg119.pdf</a:t>
+            </a:r>
+            <a:endParaRPr lang="en-US" dirty="0" smtClean="0"/>
+          </a:p>
           <a:p>
             <a:endParaRPr lang="en-US" dirty="0"/>
           </a:p>
@@ -7493,7 +7590,7 @@
   <a:extraClrSchemeLst/>
   <a:extLst>
     <a:ext uri="{05A4C25C-085E-4340-85A3-A5531E510DB2}">
-      <thm15:themeFamily xmlns="" xmlns:thm15="http://schemas.microsoft.com/office/thememl/2012/main" name="Gallery" id="{BBFCD31E-59A1-489D-B089-A3EAD7CAE12E}" vid="{AC464412-510E-4F2B-8947-A0DDBD028997}"/>
+      <thm15:themeFamily xmlns:thm15="http://schemas.microsoft.com/office/thememl/2012/main" xmlns="" name="Gallery" id="{BBFCD31E-59A1-489D-B089-A3EAD7CAE12E}" vid="{AC464412-510E-4F2B-8947-A0DDBD028997}"/>
     </a:ext>
   </a:extLst>
 </a:theme>

</xml_diff>